<commit_message>
Minor tweaks to slides for Tuesdays talk
</commit_message>
<xml_diff>
--- a/Slides/London SemWeb Meetup Talk Sept 2011.pptx
+++ b/Slides/London SemWeb Meetup Talk Sept 2011.pptx
@@ -211,7 +211,8 @@
           <a:p>
             <a:fld id="{A4EFCF4D-B222-4BDE-9F21-361A6D2DD5DC}" type="datetimeFigureOut">
               <a:rPr lang="en-GB" smtClean="0"/>
-              <a:t>20/09/2011</a:t>
+              <a:pPr/>
+              <a:t>23/09/2011</a:t>
             </a:fld>
             <a:endParaRPr lang="en-GB"/>
           </a:p>
@@ -370,6 +371,7 @@
           <a:p>
             <a:fld id="{62BAB909-6E45-45BB-A68B-B7C0D89A88D2}" type="slidenum">
               <a:rPr lang="en-GB" smtClean="0"/>
+              <a:pPr/>
               <a:t>‹#›</a:t>
             </a:fld>
             <a:endParaRPr lang="en-GB"/>
@@ -379,7 +381,7 @@
     </p:spTree>
     <p:extLst>
       <p:ext uri="{BB962C8B-B14F-4D97-AF65-F5344CB8AC3E}">
-        <p14:creationId xmlns:p14="http://schemas.microsoft.com/office/powerpoint/2010/main" val="3764111685"/>
+        <p14:creationId xmlns:p14="http://schemas.microsoft.com/office/powerpoint/2010/main" xmlns="" val="3764111685"/>
       </p:ext>
     </p:extLst>
   </p:cSld>
@@ -3484,7 +3486,7 @@
     </p:spTree>
     <p:extLst>
       <p:ext uri="{BB962C8B-B14F-4D97-AF65-F5344CB8AC3E}">
-        <p14:creationId xmlns:p14="http://schemas.microsoft.com/office/powerpoint/2010/main" val="2994720284"/>
+        <p14:creationId xmlns:p14="http://schemas.microsoft.com/office/powerpoint/2010/main" xmlns="" val="2994720284"/>
       </p:ext>
     </p:extLst>
   </p:cSld>
@@ -3669,7 +3671,7 @@
     </p:spTree>
     <p:extLst>
       <p:ext uri="{BB962C8B-B14F-4D97-AF65-F5344CB8AC3E}">
-        <p14:creationId xmlns:p14="http://schemas.microsoft.com/office/powerpoint/2010/main" val="156102642"/>
+        <p14:creationId xmlns:p14="http://schemas.microsoft.com/office/powerpoint/2010/main" xmlns="" val="156102642"/>
       </p:ext>
     </p:extLst>
   </p:cSld>
@@ -3829,7 +3831,7 @@
     </p:spTree>
     <p:extLst>
       <p:ext uri="{BB962C8B-B14F-4D97-AF65-F5344CB8AC3E}">
-        <p14:creationId xmlns:p14="http://schemas.microsoft.com/office/powerpoint/2010/main" val="2065785744"/>
+        <p14:creationId xmlns:p14="http://schemas.microsoft.com/office/powerpoint/2010/main" xmlns="" val="2065785744"/>
       </p:ext>
     </p:extLst>
   </p:cSld>
@@ -3873,7 +3875,7 @@
           <a:p>
             <a:r>
               <a:rPr lang="en-GB" dirty="0" err="1" smtClean="0"/>
-              <a:t>arq.query</a:t>
+              <a:t>arq</a:t>
             </a:r>
             <a:r>
               <a:rPr lang="en-GB" dirty="0" smtClean="0"/>
@@ -3935,15 +3937,15 @@
             <a:pPr lvl="1"/>
             <a:r>
               <a:rPr lang="en-GB" dirty="0" smtClean="0"/>
-              <a:t>java </a:t>
-            </a:r>
-            <a:r>
-              <a:rPr lang="en-GB" dirty="0" err="1" smtClean="0"/>
-              <a:t>arq.query</a:t>
-            </a:r>
-            <a:r>
-              <a:rPr lang="en-GB" dirty="0" smtClean="0"/>
-              <a:t> --query </a:t>
+              <a:t>arq.bat </a:t>
+            </a:r>
+            <a:r>
+              <a:rPr lang="en-GB" dirty="0" smtClean="0"/>
+              <a:t>--</a:t>
+            </a:r>
+            <a:r>
+              <a:rPr lang="en-GB" dirty="0" smtClean="0"/>
+              <a:t>query </a:t>
             </a:r>
             <a:r>
               <a:rPr lang="en-GB" dirty="0" err="1" smtClean="0"/>
@@ -3951,11 +3953,7 @@
             </a:r>
             <a:r>
               <a:rPr lang="en-GB" dirty="0" smtClean="0"/>
-              <a:t> --data </a:t>
-            </a:r>
-            <a:r>
-              <a:rPr lang="en-GB" dirty="0" err="1" smtClean="0"/>
-              <a:t>data.ttl</a:t>
+              <a:t> --data data.ttl</a:t>
             </a:r>
             <a:endParaRPr lang="en-GB" dirty="0"/>
           </a:p>
@@ -4034,7 +4032,7 @@
     </p:spTree>
     <p:extLst>
       <p:ext uri="{BB962C8B-B14F-4D97-AF65-F5344CB8AC3E}">
-        <p14:creationId xmlns:p14="http://schemas.microsoft.com/office/powerpoint/2010/main" val="1919063700"/>
+        <p14:creationId xmlns:p14="http://schemas.microsoft.com/office/powerpoint/2010/main" xmlns="" val="1919063700"/>
       </p:ext>
     </p:extLst>
   </p:cSld>
@@ -4220,7 +4218,7 @@
     </p:spTree>
     <p:extLst>
       <p:ext uri="{BB962C8B-B14F-4D97-AF65-F5344CB8AC3E}">
-        <p14:creationId xmlns:p14="http://schemas.microsoft.com/office/powerpoint/2010/main" val="1170549830"/>
+        <p14:creationId xmlns:p14="http://schemas.microsoft.com/office/powerpoint/2010/main" xmlns="" val="1170549830"/>
       </p:ext>
     </p:extLst>
   </p:cSld>
@@ -4403,7 +4401,7 @@
     </p:spTree>
     <p:extLst>
       <p:ext uri="{BB962C8B-B14F-4D97-AF65-F5344CB8AC3E}">
-        <p14:creationId xmlns:p14="http://schemas.microsoft.com/office/powerpoint/2010/main" val="1540450890"/>
+        <p14:creationId xmlns:p14="http://schemas.microsoft.com/office/powerpoint/2010/main" xmlns="" val="1540450890"/>
       </p:ext>
     </p:extLst>
   </p:cSld>
@@ -4562,7 +4560,7 @@
     </p:spTree>
     <p:extLst>
       <p:ext uri="{BB962C8B-B14F-4D97-AF65-F5344CB8AC3E}">
-        <p14:creationId xmlns:p14="http://schemas.microsoft.com/office/powerpoint/2010/main" val="4161036012"/>
+        <p14:creationId xmlns:p14="http://schemas.microsoft.com/office/powerpoint/2010/main" xmlns="" val="4161036012"/>
       </p:ext>
     </p:extLst>
   </p:cSld>
@@ -4759,7 +4757,7 @@
     </p:spTree>
     <p:extLst>
       <p:ext uri="{BB962C8B-B14F-4D97-AF65-F5344CB8AC3E}">
-        <p14:creationId xmlns:p14="http://schemas.microsoft.com/office/powerpoint/2010/main" val="2049121592"/>
+        <p14:creationId xmlns:p14="http://schemas.microsoft.com/office/powerpoint/2010/main" xmlns="" val="2049121592"/>
       </p:ext>
     </p:extLst>
   </p:cSld>
@@ -4945,7 +4943,7 @@
     </p:spTree>
     <p:extLst>
       <p:ext uri="{BB962C8B-B14F-4D97-AF65-F5344CB8AC3E}">
-        <p14:creationId xmlns:p14="http://schemas.microsoft.com/office/powerpoint/2010/main" val="2930425621"/>
+        <p14:creationId xmlns:p14="http://schemas.microsoft.com/office/powerpoint/2010/main" xmlns="" val="2930425621"/>
       </p:ext>
     </p:extLst>
   </p:cSld>
@@ -5140,7 +5138,7 @@
     </p:spTree>
     <p:extLst>
       <p:ext uri="{BB962C8B-B14F-4D97-AF65-F5344CB8AC3E}">
-        <p14:creationId xmlns:p14="http://schemas.microsoft.com/office/powerpoint/2010/main" val="705525587"/>
+        <p14:creationId xmlns:p14="http://schemas.microsoft.com/office/powerpoint/2010/main" xmlns="" val="705525587"/>
       </p:ext>
     </p:extLst>
   </p:cSld>
@@ -5335,7 +5333,7 @@
     </p:spTree>
     <p:extLst>
       <p:ext uri="{BB962C8B-B14F-4D97-AF65-F5344CB8AC3E}">
-        <p14:creationId xmlns:p14="http://schemas.microsoft.com/office/powerpoint/2010/main" val="1040737737"/>
+        <p14:creationId xmlns:p14="http://schemas.microsoft.com/office/powerpoint/2010/main" xmlns="" val="1040737737"/>
       </p:ext>
     </p:extLst>
   </p:cSld>
@@ -5424,7 +5422,7 @@
     </p:spTree>
     <p:extLst>
       <p:ext uri="{BB962C8B-B14F-4D97-AF65-F5344CB8AC3E}">
-        <p14:creationId xmlns:p14="http://schemas.microsoft.com/office/powerpoint/2010/main" val="3679833452"/>
+        <p14:creationId xmlns:p14="http://schemas.microsoft.com/office/powerpoint/2010/main" xmlns="" val="3679833452"/>
       </p:ext>
     </p:extLst>
   </p:cSld>
@@ -5597,7 +5595,7 @@
     </p:spTree>
     <p:extLst>
       <p:ext uri="{BB962C8B-B14F-4D97-AF65-F5344CB8AC3E}">
-        <p14:creationId xmlns:p14="http://schemas.microsoft.com/office/powerpoint/2010/main" val="4125537842"/>
+        <p14:creationId xmlns:p14="http://schemas.microsoft.com/office/powerpoint/2010/main" xmlns="" val="4125537842"/>
       </p:ext>
     </p:extLst>
   </p:cSld>
@@ -5772,7 +5770,7 @@
     </p:spTree>
     <p:extLst>
       <p:ext uri="{BB962C8B-B14F-4D97-AF65-F5344CB8AC3E}">
-        <p14:creationId xmlns:p14="http://schemas.microsoft.com/office/powerpoint/2010/main" val="2526724232"/>
+        <p14:creationId xmlns:p14="http://schemas.microsoft.com/office/powerpoint/2010/main" xmlns="" val="2526724232"/>
       </p:ext>
     </p:extLst>
   </p:cSld>
@@ -5938,7 +5936,7 @@
     </p:spTree>
     <p:extLst>
       <p:ext uri="{BB962C8B-B14F-4D97-AF65-F5344CB8AC3E}">
-        <p14:creationId xmlns:p14="http://schemas.microsoft.com/office/powerpoint/2010/main" val="1379085774"/>
+        <p14:creationId xmlns:p14="http://schemas.microsoft.com/office/powerpoint/2010/main" xmlns="" val="1379085774"/>
       </p:ext>
     </p:extLst>
   </p:cSld>
@@ -6133,7 +6131,7 @@
     </p:spTree>
     <p:extLst>
       <p:ext uri="{BB962C8B-B14F-4D97-AF65-F5344CB8AC3E}">
-        <p14:creationId xmlns:p14="http://schemas.microsoft.com/office/powerpoint/2010/main" val="664525842"/>
+        <p14:creationId xmlns:p14="http://schemas.microsoft.com/office/powerpoint/2010/main" xmlns="" val="664525842"/>
       </p:ext>
     </p:extLst>
   </p:cSld>
@@ -6324,7 +6322,7 @@
     </p:spTree>
     <p:extLst>
       <p:ext uri="{BB962C8B-B14F-4D97-AF65-F5344CB8AC3E}">
-        <p14:creationId xmlns:p14="http://schemas.microsoft.com/office/powerpoint/2010/main" val="1760005828"/>
+        <p14:creationId xmlns:p14="http://schemas.microsoft.com/office/powerpoint/2010/main" xmlns="" val="1760005828"/>
       </p:ext>
     </p:extLst>
   </p:cSld>
@@ -6565,7 +6563,7 @@
     </p:spTree>
     <p:extLst>
       <p:ext uri="{BB962C8B-B14F-4D97-AF65-F5344CB8AC3E}">
-        <p14:creationId xmlns:p14="http://schemas.microsoft.com/office/powerpoint/2010/main" val="1688459602"/>
+        <p14:creationId xmlns:p14="http://schemas.microsoft.com/office/powerpoint/2010/main" xmlns="" val="1688459602"/>
       </p:ext>
     </p:extLst>
   </p:cSld>
@@ -6754,7 +6752,7 @@
     </p:spTree>
     <p:extLst>
       <p:ext uri="{BB962C8B-B14F-4D97-AF65-F5344CB8AC3E}">
-        <p14:creationId xmlns:p14="http://schemas.microsoft.com/office/powerpoint/2010/main" val="4208420243"/>
+        <p14:creationId xmlns:p14="http://schemas.microsoft.com/office/powerpoint/2010/main" xmlns="" val="4208420243"/>
       </p:ext>
     </p:extLst>
   </p:cSld>

</xml_diff>

<commit_message>
More prototype work on revised New Connection Interface for Store Manager
</commit_message>
<xml_diff>
--- a/Slides/London SemWeb Meetup Talk Sept 2011.pptx
+++ b/Slides/London SemWeb Meetup Talk Sept 2011.pptx
@@ -5,7 +5,7 @@
     <p:sldMasterId id="2147483648" r:id="rId1"/>
   </p:sldMasterIdLst>
   <p:notesMasterIdLst>
-    <p:notesMasterId r:id="rId22"/>
+    <p:notesMasterId r:id="rId21"/>
   </p:notesMasterIdLst>
   <p:sldIdLst>
     <p:sldId id="256" r:id="rId2"/>
@@ -16,18 +16,17 @@
     <p:sldId id="260" r:id="rId7"/>
     <p:sldId id="261" r:id="rId8"/>
     <p:sldId id="262" r:id="rId9"/>
-    <p:sldId id="263" r:id="rId10"/>
-    <p:sldId id="264" r:id="rId11"/>
-    <p:sldId id="269" r:id="rId12"/>
-    <p:sldId id="265" r:id="rId13"/>
-    <p:sldId id="271" r:id="rId14"/>
-    <p:sldId id="272" r:id="rId15"/>
-    <p:sldId id="274" r:id="rId16"/>
-    <p:sldId id="266" r:id="rId17"/>
-    <p:sldId id="276" r:id="rId18"/>
+    <p:sldId id="264" r:id="rId10"/>
+    <p:sldId id="269" r:id="rId11"/>
+    <p:sldId id="265" r:id="rId12"/>
+    <p:sldId id="271" r:id="rId13"/>
+    <p:sldId id="272" r:id="rId14"/>
+    <p:sldId id="274" r:id="rId15"/>
+    <p:sldId id="266" r:id="rId16"/>
+    <p:sldId id="276" r:id="rId17"/>
+    <p:sldId id="275" r:id="rId18"/>
     <p:sldId id="273" r:id="rId19"/>
-    <p:sldId id="275" r:id="rId20"/>
-    <p:sldId id="268" r:id="rId21"/>
+    <p:sldId id="268" r:id="rId20"/>
   </p:sldIdLst>
   <p:sldSz cx="9144000" cy="6858000" type="screen4x3"/>
   <p:notesSz cx="7099300" cy="10223500"/>
@@ -212,7 +211,7 @@
             <a:fld id="{A4EFCF4D-B222-4BDE-9F21-361A6D2DD5DC}" type="datetimeFigureOut">
               <a:rPr lang="en-GB" smtClean="0"/>
               <a:pPr/>
-              <a:t>23/09/2011</a:t>
+              <a:t>27/09/2011</a:t>
             </a:fld>
             <a:endParaRPr lang="en-GB"/>
           </a:p>
@@ -381,7 +380,7 @@
     </p:spTree>
     <p:extLst>
       <p:ext uri="{BB962C8B-B14F-4D97-AF65-F5344CB8AC3E}">
-        <p14:creationId xmlns:p14="http://schemas.microsoft.com/office/powerpoint/2010/main" xmlns="" val="3764111685"/>
+        <p14:creationId xmlns="" xmlns:p14="http://schemas.microsoft.com/office/powerpoint/2010/main" val="3764111685"/>
       </p:ext>
     </p:extLst>
   </p:cSld>
@@ -3379,30 +3378,9 @@
         </p:nvSpPr>
         <p:spPr/>
         <p:txBody>
-          <a:bodyPr/>
-          <a:lstStyle/>
-          <a:p>
-            <a:r>
-              <a:rPr lang="en-GB" dirty="0" smtClean="0"/>
-              <a:t>Tools - Editing</a:t>
-            </a:r>
-            <a:endParaRPr lang="en-GB" dirty="0"/>
-          </a:p>
-        </p:txBody>
-      </p:sp>
-      <p:sp>
-        <p:nvSpPr>
-          <p:cNvPr id="3" name="Content Placeholder 2"/>
-          <p:cNvSpPr>
-            <a:spLocks noGrp="1"/>
-          </p:cNvSpPr>
-          <p:nvPr>
-            <p:ph idx="1"/>
-          </p:nvPr>
-        </p:nvSpPr>
-        <p:spPr/>
-        <p:txBody>
-          <a:bodyPr/>
+          <a:bodyPr>
+            <a:normAutofit/>
+          </a:bodyPr>
           <a:lstStyle/>
           <a:p>
             <a:r>
@@ -3410,6 +3388,66 @@
               <a:t>rdfEditor</a:t>
             </a:r>
             <a:endParaRPr lang="en-GB" dirty="0"/>
+          </a:p>
+        </p:txBody>
+      </p:sp>
+      <p:sp>
+        <p:nvSpPr>
+          <p:cNvPr id="3" name="Content Placeholder 2"/>
+          <p:cNvSpPr>
+            <a:spLocks noGrp="1"/>
+          </p:cNvSpPr>
+          <p:nvPr>
+            <p:ph idx="1"/>
+          </p:nvPr>
+        </p:nvSpPr>
+        <p:spPr/>
+        <p:txBody>
+          <a:bodyPr>
+            <a:normAutofit lnSpcReduction="10000"/>
+          </a:bodyPr>
+          <a:lstStyle/>
+          <a:p>
+            <a:r>
+              <a:rPr lang="en-GB" dirty="0" smtClean="0"/>
+              <a:t>Part of the </a:t>
+            </a:r>
+            <a:r>
+              <a:rPr lang="en-GB" dirty="0" err="1" smtClean="0"/>
+              <a:t>dotNetRDF</a:t>
+            </a:r>
+            <a:r>
+              <a:rPr lang="en-GB" dirty="0" smtClean="0"/>
+              <a:t> Toolkit</a:t>
+            </a:r>
+          </a:p>
+          <a:p>
+            <a:pPr lvl="1"/>
+            <a:r>
+              <a:rPr lang="en-GB" dirty="0">
+                <a:hlinkClick r:id="rId2"/>
+              </a:rPr>
+              <a:t>http://</a:t>
+            </a:r>
+            <a:r>
+              <a:rPr lang="en-GB" dirty="0" smtClean="0">
+                <a:hlinkClick r:id="rId2"/>
+              </a:rPr>
+              <a:t>www.dotnetrdf.org/content.asp?pageID=rdfEditor</a:t>
+            </a:r>
+            <a:endParaRPr lang="en-GB" dirty="0" smtClean="0"/>
+          </a:p>
+          <a:p>
+            <a:r>
+              <a:rPr lang="en-GB" dirty="0" smtClean="0"/>
+              <a:t>Windows only – Mono does not support the required APIs currently</a:t>
+            </a:r>
+          </a:p>
+          <a:p>
+            <a:r>
+              <a:rPr lang="en-GB" dirty="0" smtClean="0"/>
+              <a:t>Notepad replacement for RDF Editing with syntax highlighting, auto-complete and validation capabilities</a:t>
+            </a:r>
           </a:p>
         </p:txBody>
       </p:sp>
@@ -3486,7 +3524,7 @@
     </p:spTree>
     <p:extLst>
       <p:ext uri="{BB962C8B-B14F-4D97-AF65-F5344CB8AC3E}">
-        <p14:creationId xmlns:p14="http://schemas.microsoft.com/office/powerpoint/2010/main" xmlns="" val="2994720284"/>
+        <p14:creationId xmlns="" xmlns:p14="http://schemas.microsoft.com/office/powerpoint/2010/main" val="156102642"/>
       </p:ext>
     </p:extLst>
   </p:cSld>
@@ -3525,76 +3563,68 @@
         </p:nvSpPr>
         <p:spPr/>
         <p:txBody>
+          <a:bodyPr/>
+          <a:lstStyle/>
+          <a:p>
+            <a:r>
+              <a:rPr lang="en-GB" dirty="0" smtClean="0"/>
+              <a:t>Tools - Query</a:t>
+            </a:r>
+            <a:endParaRPr lang="en-GB" dirty="0"/>
+          </a:p>
+        </p:txBody>
+      </p:sp>
+      <p:sp>
+        <p:nvSpPr>
+          <p:cNvPr id="3" name="Content Placeholder 2"/>
+          <p:cNvSpPr>
+            <a:spLocks noGrp="1"/>
+          </p:cNvSpPr>
+          <p:nvPr>
+            <p:ph idx="1"/>
+          </p:nvPr>
+        </p:nvSpPr>
+        <p:spPr/>
+        <p:txBody>
           <a:bodyPr>
             <a:normAutofit/>
           </a:bodyPr>
           <a:lstStyle/>
           <a:p>
             <a:r>
+              <a:rPr lang="en-GB" dirty="0" smtClean="0"/>
+              <a:t>You don’t want to have to create a SPARQL endpoint/write code just to test out some simple queries</a:t>
+            </a:r>
+          </a:p>
+          <a:p>
+            <a:r>
+              <a:rPr lang="en-GB" dirty="0" smtClean="0"/>
+              <a:t>Examples</a:t>
+            </a:r>
+          </a:p>
+          <a:p>
+            <a:pPr lvl="1"/>
+            <a:r>
               <a:rPr lang="en-GB" dirty="0" err="1" smtClean="0"/>
-              <a:t>rdfEditor</a:t>
+              <a:t>arq.query</a:t>
+            </a:r>
+            <a:endParaRPr lang="en-GB" dirty="0" smtClean="0"/>
+          </a:p>
+          <a:p>
+            <a:pPr lvl="1"/>
+            <a:r>
+              <a:rPr lang="en-GB" dirty="0" err="1" smtClean="0"/>
+              <a:t>SparqlGUI</a:t>
+            </a:r>
+            <a:endParaRPr lang="en-GB" dirty="0" smtClean="0"/>
+          </a:p>
+          <a:p>
+            <a:pPr lvl="1"/>
+            <a:r>
+              <a:rPr lang="en-GB" dirty="0" smtClean="0"/>
+              <a:t>Twinkle</a:t>
             </a:r>
             <a:endParaRPr lang="en-GB" dirty="0"/>
-          </a:p>
-        </p:txBody>
-      </p:sp>
-      <p:sp>
-        <p:nvSpPr>
-          <p:cNvPr id="3" name="Content Placeholder 2"/>
-          <p:cNvSpPr>
-            <a:spLocks noGrp="1"/>
-          </p:cNvSpPr>
-          <p:nvPr>
-            <p:ph idx="1"/>
-          </p:nvPr>
-        </p:nvSpPr>
-        <p:spPr/>
-        <p:txBody>
-          <a:bodyPr>
-            <a:normAutofit lnSpcReduction="10000"/>
-          </a:bodyPr>
-          <a:lstStyle/>
-          <a:p>
-            <a:r>
-              <a:rPr lang="en-GB" dirty="0" smtClean="0"/>
-              <a:t>Part of the </a:t>
-            </a:r>
-            <a:r>
-              <a:rPr lang="en-GB" dirty="0" err="1" smtClean="0"/>
-              <a:t>dotNetRDF</a:t>
-            </a:r>
-            <a:r>
-              <a:rPr lang="en-GB" dirty="0" smtClean="0"/>
-              <a:t> Toolkit</a:t>
-            </a:r>
-          </a:p>
-          <a:p>
-            <a:pPr lvl="1"/>
-            <a:r>
-              <a:rPr lang="en-GB" dirty="0">
-                <a:hlinkClick r:id="rId2"/>
-              </a:rPr>
-              <a:t>http://</a:t>
-            </a:r>
-            <a:r>
-              <a:rPr lang="en-GB" dirty="0" smtClean="0">
-                <a:hlinkClick r:id="rId2"/>
-              </a:rPr>
-              <a:t>www.dotnetrdf.org/content.asp?pageID=rdfEditor</a:t>
-            </a:r>
-            <a:endParaRPr lang="en-GB" dirty="0" smtClean="0"/>
-          </a:p>
-          <a:p>
-            <a:r>
-              <a:rPr lang="en-GB" dirty="0" smtClean="0"/>
-              <a:t>Windows only – Mono does not support the required APIs currently</a:t>
-            </a:r>
-          </a:p>
-          <a:p>
-            <a:r>
-              <a:rPr lang="en-GB" dirty="0" smtClean="0"/>
-              <a:t>Notepad replacement for RDF Editing with syntax highlighting, auto-complete and validation capabilities</a:t>
-            </a:r>
           </a:p>
         </p:txBody>
       </p:sp>
@@ -3671,7 +3701,7 @@
     </p:spTree>
     <p:extLst>
       <p:ext uri="{BB962C8B-B14F-4D97-AF65-F5344CB8AC3E}">
-        <p14:creationId xmlns:p14="http://schemas.microsoft.com/office/powerpoint/2010/main" xmlns="" val="156102642"/>
+        <p14:creationId xmlns="" xmlns:p14="http://schemas.microsoft.com/office/powerpoint/2010/main" val="2065785744"/>
       </p:ext>
     </p:extLst>
   </p:cSld>
@@ -3714,8 +3744,12 @@
           <a:lstStyle/>
           <a:p>
             <a:r>
-              <a:rPr lang="en-GB" dirty="0" smtClean="0"/>
-              <a:t>Tools - Query</a:t>
+              <a:rPr lang="en-GB" dirty="0" err="1" smtClean="0"/>
+              <a:t>arq</a:t>
+            </a:r>
+            <a:r>
+              <a:rPr lang="en-GB" dirty="0" smtClean="0"/>
+              <a:t>	</a:t>
             </a:r>
             <a:endParaRPr lang="en-GB" dirty="0"/>
           </a:p>
@@ -3737,22 +3771,51 @@
           <a:lstStyle/>
           <a:p>
             <a:r>
+              <a:rPr lang="en-GB" dirty="0" smtClean="0"/>
+              <a:t>Part of the Jena family of tooling</a:t>
+            </a:r>
+          </a:p>
+          <a:p>
+            <a:pPr lvl="1"/>
+            <a:r>
+              <a:rPr lang="en-GB" dirty="0">
+                <a:hlinkClick r:id="rId2"/>
+              </a:rPr>
+              <a:t>http://</a:t>
+            </a:r>
+            <a:r>
+              <a:rPr lang="en-GB" dirty="0" smtClean="0">
+                <a:hlinkClick r:id="rId2"/>
+              </a:rPr>
+              <a:t>jena.sourceforge.net/ARQ/cmds.html</a:t>
+            </a:r>
+            <a:endParaRPr lang="en-GB" dirty="0" smtClean="0"/>
+          </a:p>
+          <a:p>
+            <a:r>
+              <a:rPr lang="en-GB" dirty="0" smtClean="0"/>
+              <a:t>Provides a command line interface to the Jena ARQ query library – probably the most mature and complete SPARQL 1.1 engine available</a:t>
+            </a:r>
+          </a:p>
+          <a:p>
+            <a:r>
+              <a:rPr lang="en-GB" dirty="0" smtClean="0"/>
+              <a:t>Example Usage:</a:t>
+            </a:r>
+          </a:p>
+          <a:p>
+            <a:pPr lvl="1"/>
+            <a:r>
+              <a:rPr lang="en-GB" dirty="0" smtClean="0"/>
+              <a:t>arq.bat --query </a:t>
+            </a:r>
+            <a:r>
               <a:rPr lang="en-GB" dirty="0" err="1" smtClean="0"/>
-              <a:t>arq.query</a:t>
-            </a:r>
-            <a:endParaRPr lang="en-GB" dirty="0" smtClean="0"/>
-          </a:p>
-          <a:p>
-            <a:r>
-              <a:rPr lang="en-GB" dirty="0" err="1" smtClean="0"/>
-              <a:t>SparqlGUI</a:t>
-            </a:r>
-            <a:endParaRPr lang="en-GB" dirty="0" smtClean="0"/>
-          </a:p>
-          <a:p>
-            <a:r>
-              <a:rPr lang="en-GB" dirty="0" smtClean="0"/>
-              <a:t>Twinkle</a:t>
+              <a:t>query.rq</a:t>
+            </a:r>
+            <a:r>
+              <a:rPr lang="en-GB" dirty="0" smtClean="0"/>
+              <a:t> --data data.ttl</a:t>
             </a:r>
             <a:endParaRPr lang="en-GB" dirty="0"/>
           </a:p>
@@ -3831,7 +3894,7 @@
     </p:spTree>
     <p:extLst>
       <p:ext uri="{BB962C8B-B14F-4D97-AF65-F5344CB8AC3E}">
-        <p14:creationId xmlns:p14="http://schemas.microsoft.com/office/powerpoint/2010/main" xmlns="" val="2065785744"/>
+        <p14:creationId xmlns="" xmlns:p14="http://schemas.microsoft.com/office/powerpoint/2010/main" val="1919063700"/>
       </p:ext>
     </p:extLst>
   </p:cSld>
@@ -3875,11 +3938,7 @@
           <a:p>
             <a:r>
               <a:rPr lang="en-GB" dirty="0" err="1" smtClean="0"/>
-              <a:t>arq</a:t>
-            </a:r>
-            <a:r>
-              <a:rPr lang="en-GB" dirty="0" smtClean="0"/>
-              <a:t>	</a:t>
+              <a:t>SparqlGUI</a:t>
             </a:r>
             <a:endParaRPr lang="en-GB" dirty="0"/>
           </a:p>
@@ -3902,7 +3961,15 @@
           <a:p>
             <a:r>
               <a:rPr lang="en-GB" dirty="0" smtClean="0"/>
-              <a:t>Part of the Jena family of tooling</a:t>
+              <a:t>Part of the </a:t>
+            </a:r>
+            <a:r>
+              <a:rPr lang="en-GB" dirty="0" err="1" smtClean="0"/>
+              <a:t>dotNetRDF</a:t>
+            </a:r>
+            <a:r>
+              <a:rPr lang="en-GB" dirty="0" smtClean="0"/>
+              <a:t> Toolkit</a:t>
             </a:r>
           </a:p>
           <a:p>
@@ -3917,43 +3984,24 @@
               <a:rPr lang="en-GB" dirty="0" smtClean="0">
                 <a:hlinkClick r:id="rId2"/>
               </a:rPr>
-              <a:t>jena.sourceforge.net/ARQ/cmds.html</a:t>
+              <a:t>www.dotnetrdf.org/content.asp?pageID=SparqlGUI</a:t>
             </a:r>
             <a:endParaRPr lang="en-GB" dirty="0" smtClean="0"/>
           </a:p>
           <a:p>
             <a:r>
-              <a:rPr lang="en-GB" dirty="0" smtClean="0"/>
-              <a:t>Provides a command line interface to the Jena ARQ query library – probably the most mature and complete SPARQL 1.1 engine available</a:t>
-            </a:r>
-          </a:p>
-          <a:p>
-            <a:r>
-              <a:rPr lang="en-GB" dirty="0" smtClean="0"/>
-              <a:t>Example Usage:</a:t>
-            </a:r>
-          </a:p>
-          <a:p>
-            <a:pPr lvl="1"/>
-            <a:r>
-              <a:rPr lang="en-GB" dirty="0" smtClean="0"/>
-              <a:t>arq.bat </a:t>
-            </a:r>
-            <a:r>
-              <a:rPr lang="en-GB" dirty="0" smtClean="0"/>
-              <a:t>--</a:t>
-            </a:r>
-            <a:r>
-              <a:rPr lang="en-GB" dirty="0" smtClean="0"/>
-              <a:t>query </a:t>
-            </a:r>
-            <a:r>
               <a:rPr lang="en-GB" dirty="0" err="1" smtClean="0"/>
-              <a:t>query.rq</a:t>
-            </a:r>
-            <a:r>
-              <a:rPr lang="en-GB" dirty="0" smtClean="0"/>
-              <a:t> --data data.ttl</a:t>
+              <a:t>.Net</a:t>
+            </a:r>
+            <a:r>
+              <a:rPr lang="en-GB" dirty="0" smtClean="0"/>
+              <a:t> Based – needs Mono on *nix</a:t>
+            </a:r>
+          </a:p>
+          <a:p>
+            <a:r>
+              <a:rPr lang="en-GB" dirty="0" smtClean="0"/>
+              <a:t>GUI Interface for quickly testing queries</a:t>
             </a:r>
             <a:endParaRPr lang="en-GB" dirty="0"/>
           </a:p>
@@ -4032,7 +4080,7 @@
     </p:spTree>
     <p:extLst>
       <p:ext uri="{BB962C8B-B14F-4D97-AF65-F5344CB8AC3E}">
-        <p14:creationId xmlns:p14="http://schemas.microsoft.com/office/powerpoint/2010/main" xmlns="" val="1919063700"/>
+        <p14:creationId xmlns="" xmlns:p14="http://schemas.microsoft.com/office/powerpoint/2010/main" val="1170549830"/>
       </p:ext>
     </p:extLst>
   </p:cSld>
@@ -4075,39 +4123,47 @@
           <a:lstStyle/>
           <a:p>
             <a:r>
+              <a:rPr lang="en-GB" dirty="0" smtClean="0"/>
+              <a:t>Twinkle</a:t>
+            </a:r>
+            <a:endParaRPr lang="en-GB" dirty="0"/>
+          </a:p>
+        </p:txBody>
+      </p:sp>
+      <p:sp>
+        <p:nvSpPr>
+          <p:cNvPr id="3" name="Content Placeholder 2"/>
+          <p:cNvSpPr>
+            <a:spLocks noGrp="1"/>
+          </p:cNvSpPr>
+          <p:nvPr>
+            <p:ph idx="1"/>
+          </p:nvPr>
+        </p:nvSpPr>
+        <p:spPr/>
+        <p:txBody>
+          <a:bodyPr/>
+          <a:lstStyle/>
+          <a:p>
+            <a:r>
+              <a:rPr lang="en-GB" dirty="0" smtClean="0"/>
+              <a:t>GUI Interface for SPARQL queries built by Leigh </a:t>
+            </a:r>
+            <a:r>
               <a:rPr lang="en-GB" dirty="0" err="1" smtClean="0"/>
-              <a:t>SparqlGUI</a:t>
-            </a:r>
-            <a:endParaRPr lang="en-GB" dirty="0"/>
-          </a:p>
-        </p:txBody>
-      </p:sp>
-      <p:sp>
-        <p:nvSpPr>
-          <p:cNvPr id="3" name="Content Placeholder 2"/>
-          <p:cNvSpPr>
-            <a:spLocks noGrp="1"/>
-          </p:cNvSpPr>
-          <p:nvPr>
-            <p:ph idx="1"/>
-          </p:nvPr>
-        </p:nvSpPr>
-        <p:spPr/>
-        <p:txBody>
-          <a:bodyPr/>
-          <a:lstStyle/>
-          <a:p>
-            <a:r>
-              <a:rPr lang="en-GB" dirty="0" smtClean="0"/>
-              <a:t>Part of the </a:t>
+              <a:t>Dodds</a:t>
+            </a:r>
+            <a:r>
+              <a:rPr lang="en-GB" dirty="0" smtClean="0"/>
+              <a:t> (</a:t>
             </a:r>
             <a:r>
               <a:rPr lang="en-GB" dirty="0" err="1" smtClean="0"/>
-              <a:t>dotNetRDF</a:t>
-            </a:r>
-            <a:r>
-              <a:rPr lang="en-GB" dirty="0" smtClean="0"/>
-              <a:t> Toolkit</a:t>
+              <a:t>Talis</a:t>
+            </a:r>
+            <a:r>
+              <a:rPr lang="en-GB" dirty="0" smtClean="0"/>
+              <a:t>)</a:t>
             </a:r>
           </a:p>
           <a:p>
@@ -4116,32 +4172,21 @@
               <a:rPr lang="en-GB" dirty="0">
                 <a:hlinkClick r:id="rId2"/>
               </a:rPr>
-              <a:t>http://</a:t>
+              <a:t>http://www.ldodds.com/projects/twinkle</a:t>
             </a:r>
             <a:r>
               <a:rPr lang="en-GB" dirty="0" smtClean="0">
                 <a:hlinkClick r:id="rId2"/>
               </a:rPr>
-              <a:t>www.dotnetrdf.org/content.asp?pageID=SparqlGUI</a:t>
+              <a:t>/</a:t>
             </a:r>
             <a:endParaRPr lang="en-GB" dirty="0" smtClean="0"/>
           </a:p>
           <a:p>
             <a:r>
-              <a:rPr lang="en-GB" dirty="0" err="1" smtClean="0"/>
-              <a:t>.Net</a:t>
-            </a:r>
-            <a:r>
-              <a:rPr lang="en-GB" dirty="0" smtClean="0"/>
-              <a:t> Based – needs Mono on *nix</a:t>
-            </a:r>
-          </a:p>
-          <a:p>
-            <a:r>
-              <a:rPr lang="en-GB" dirty="0" smtClean="0"/>
-              <a:t>GUI Interface for quickly testing queries</a:t>
-            </a:r>
-            <a:endParaRPr lang="en-GB" dirty="0"/>
+              <a:rPr lang="en-GB" dirty="0" smtClean="0"/>
+              <a:t>Note – AFAIK no longer actively developed and used out-dated version of ARQ so doesn’t support SPARQL 1.1 fully</a:t>
+            </a:r>
           </a:p>
         </p:txBody>
       </p:sp>
@@ -4218,7 +4263,7 @@
     </p:spTree>
     <p:extLst>
       <p:ext uri="{BB962C8B-B14F-4D97-AF65-F5344CB8AC3E}">
-        <p14:creationId xmlns:p14="http://schemas.microsoft.com/office/powerpoint/2010/main" xmlns="" val="1170549830"/>
+        <p14:creationId xmlns="" xmlns:p14="http://schemas.microsoft.com/office/powerpoint/2010/main" val="1540450890"/>
       </p:ext>
     </p:extLst>
   </p:cSld>
@@ -4262,7 +4307,7 @@
           <a:p>
             <a:r>
               <a:rPr lang="en-GB" dirty="0" smtClean="0"/>
-              <a:t>Twinkle</a:t>
+              <a:t>Tools – Storage and Management</a:t>
             </a:r>
             <a:endParaRPr lang="en-GB" dirty="0"/>
           </a:p>
@@ -4280,51 +4325,80 @@
         </p:nvSpPr>
         <p:spPr/>
         <p:txBody>
-          <a:bodyPr/>
-          <a:lstStyle/>
-          <a:p>
-            <a:r>
-              <a:rPr lang="en-GB" dirty="0" smtClean="0"/>
-              <a:t>GUI Interface for SPARQL queries built by Leigh </a:t>
-            </a:r>
+          <a:bodyPr>
+            <a:normAutofit fontScale="85000" lnSpcReduction="20000"/>
+          </a:bodyPr>
+          <a:lstStyle/>
+          <a:p>
+            <a:r>
+              <a:rPr lang="en-GB" dirty="0" smtClean="0"/>
+              <a:t>Most Stores require a lot of setup to use</a:t>
+            </a:r>
+          </a:p>
+          <a:p>
+            <a:pPr lvl="1"/>
+            <a:r>
+              <a:rPr lang="en-GB" dirty="0" smtClean="0"/>
+              <a:t>For simple prototypes this is overkill</a:t>
+            </a:r>
+            <a:endParaRPr lang="en-GB" dirty="0" smtClean="0"/>
+          </a:p>
+          <a:p>
+            <a:r>
+              <a:rPr lang="en-GB" dirty="0" smtClean="0"/>
+              <a:t>Most Stores have web based interface or custom client</a:t>
+            </a:r>
+          </a:p>
+          <a:p>
+            <a:pPr lvl="1"/>
+            <a:r>
+              <a:rPr lang="en-GB" dirty="0" smtClean="0"/>
+              <a:t>No standard user experience</a:t>
+            </a:r>
+          </a:p>
+          <a:p>
+            <a:pPr lvl="1"/>
+            <a:r>
+              <a:rPr lang="en-GB" dirty="0" smtClean="0"/>
+              <a:t>Custom clients often contain arcane and specialist features that aren’t relevant to average user</a:t>
+            </a:r>
+          </a:p>
+          <a:p>
+            <a:r>
+              <a:rPr lang="en-GB" dirty="0" smtClean="0"/>
+              <a:t>Examples</a:t>
+            </a:r>
+          </a:p>
+          <a:p>
+            <a:pPr lvl="1"/>
             <a:r>
               <a:rPr lang="en-GB" dirty="0" err="1" smtClean="0"/>
-              <a:t>Dodds</a:t>
-            </a:r>
-            <a:r>
-              <a:rPr lang="en-GB" dirty="0" smtClean="0"/>
-              <a:t> (</a:t>
-            </a:r>
-            <a:r>
-              <a:rPr lang="en-GB" dirty="0" err="1" smtClean="0"/>
-              <a:t>Talis</a:t>
-            </a:r>
-            <a:r>
-              <a:rPr lang="en-GB" dirty="0" smtClean="0"/>
-              <a:t>)</a:t>
-            </a:r>
+              <a:t>Fuseki</a:t>
+            </a:r>
+            <a:endParaRPr lang="en-GB" dirty="0" smtClean="0"/>
           </a:p>
           <a:p>
             <a:pPr lvl="1"/>
             <a:r>
-              <a:rPr lang="en-GB" dirty="0">
-                <a:hlinkClick r:id="rId2"/>
-              </a:rPr>
-              <a:t>http://www.ldodds.com/projects/twinkle</a:t>
-            </a:r>
-            <a:r>
-              <a:rPr lang="en-GB" dirty="0" smtClean="0">
-                <a:hlinkClick r:id="rId2"/>
-              </a:rPr>
-              <a:t>/</a:t>
-            </a:r>
-            <a:endParaRPr lang="en-GB" dirty="0" smtClean="0"/>
-          </a:p>
-          <a:p>
-            <a:r>
-              <a:rPr lang="en-GB" dirty="0" smtClean="0"/>
-              <a:t>Note – AFAIK no longer actively developed and used out-dated version of ARQ so doesn’t support SPARQL 1.1 fully</a:t>
-            </a:r>
+              <a:rPr lang="en-GB" dirty="0" smtClean="0"/>
+              <a:t>Sesame </a:t>
+            </a:r>
+            <a:r>
+              <a:rPr lang="en-GB" dirty="0" smtClean="0"/>
+              <a:t>Windows </a:t>
+            </a:r>
+            <a:r>
+              <a:rPr lang="en-GB" dirty="0" smtClean="0"/>
+              <a:t>Client</a:t>
+            </a:r>
+          </a:p>
+          <a:p>
+            <a:pPr lvl="1"/>
+            <a:r>
+              <a:rPr lang="en-GB" dirty="0" smtClean="0"/>
+              <a:t>Store Manager</a:t>
+            </a:r>
+            <a:endParaRPr lang="en-GB" dirty="0"/>
           </a:p>
         </p:txBody>
       </p:sp>
@@ -4401,7 +4475,7 @@
     </p:spTree>
     <p:extLst>
       <p:ext uri="{BB962C8B-B14F-4D97-AF65-F5344CB8AC3E}">
-        <p14:creationId xmlns:p14="http://schemas.microsoft.com/office/powerpoint/2010/main" xmlns="" val="1540450890"/>
+        <p14:creationId xmlns="" xmlns:p14="http://schemas.microsoft.com/office/powerpoint/2010/main" val="4161036012"/>
       </p:ext>
     </p:extLst>
   </p:cSld>
@@ -4444,44 +4518,82 @@
           <a:lstStyle/>
           <a:p>
             <a:r>
-              <a:rPr lang="en-GB" dirty="0" smtClean="0"/>
-              <a:t>Tools – Storage and Management</a:t>
-            </a:r>
-            <a:endParaRPr lang="en-GB" dirty="0"/>
-          </a:p>
-        </p:txBody>
-      </p:sp>
-      <p:sp>
-        <p:nvSpPr>
-          <p:cNvPr id="3" name="Content Placeholder 2"/>
-          <p:cNvSpPr>
-            <a:spLocks noGrp="1"/>
-          </p:cNvSpPr>
-          <p:nvPr>
-            <p:ph idx="1"/>
-          </p:nvPr>
-        </p:nvSpPr>
-        <p:spPr/>
-        <p:txBody>
-          <a:bodyPr/>
-          <a:lstStyle/>
-          <a:p>
-            <a:r>
               <a:rPr lang="en-GB" dirty="0" err="1" smtClean="0"/>
               <a:t>Fuseki</a:t>
             </a:r>
+            <a:endParaRPr lang="en-GB" dirty="0"/>
+          </a:p>
+        </p:txBody>
+      </p:sp>
+      <p:sp>
+        <p:nvSpPr>
+          <p:cNvPr id="3" name="Content Placeholder 2"/>
+          <p:cNvSpPr>
+            <a:spLocks noGrp="1"/>
+          </p:cNvSpPr>
+          <p:nvPr>
+            <p:ph idx="1"/>
+          </p:nvPr>
+        </p:nvSpPr>
+        <p:spPr/>
+        <p:txBody>
+          <a:bodyPr>
+            <a:normAutofit fontScale="92500" lnSpcReduction="10000"/>
+          </a:bodyPr>
+          <a:lstStyle/>
+          <a:p>
+            <a:r>
+              <a:rPr lang="en-GB" dirty="0" smtClean="0"/>
+              <a:t>Part of the family of Jena Tooling</a:t>
+            </a:r>
+          </a:p>
+          <a:p>
+            <a:pPr lvl="1"/>
+            <a:r>
+              <a:rPr lang="en-GB" dirty="0">
+                <a:hlinkClick r:id="rId2"/>
+              </a:rPr>
+              <a:t>http://</a:t>
+            </a:r>
+            <a:r>
+              <a:rPr lang="en-GB" dirty="0" smtClean="0">
+                <a:hlinkClick r:id="rId2"/>
+              </a:rPr>
+              <a:t>openjena.org/wiki/Fuseki</a:t>
+            </a:r>
             <a:endParaRPr lang="en-GB" dirty="0" smtClean="0"/>
           </a:p>
           <a:p>
             <a:r>
               <a:rPr lang="en-GB" dirty="0" smtClean="0"/>
-              <a:t>Store Manager</a:t>
-            </a:r>
-          </a:p>
-          <a:p>
-            <a:r>
-              <a:rPr lang="en-GB" dirty="0" smtClean="0"/>
-              <a:t>Sesame Windows Client</a:t>
+              <a:t>Provides a HTTP server for SPARQL Query and Update runnable from the command line</a:t>
+            </a:r>
+          </a:p>
+          <a:p>
+            <a:r>
+              <a:rPr lang="en-GB" dirty="0" smtClean="0"/>
+              <a:t>Can use persistent TDB storage (Jena’s native triple store)</a:t>
+            </a:r>
+          </a:p>
+          <a:p>
+            <a:r>
+              <a:rPr lang="en-GB" dirty="0" smtClean="0"/>
+              <a:t>Example Usage:</a:t>
+            </a:r>
+          </a:p>
+          <a:p>
+            <a:pPr lvl="1"/>
+            <a:r>
+              <a:rPr lang="en-GB" dirty="0" smtClean="0"/>
+              <a:t>java –jar fuseki-sys.jar --update --</a:t>
+            </a:r>
+            <a:r>
+              <a:rPr lang="en-GB" dirty="0" err="1" smtClean="0"/>
+              <a:t>loc</a:t>
+            </a:r>
+            <a:r>
+              <a:rPr lang="en-GB" dirty="0" smtClean="0"/>
+              <a:t>=DB</a:t>
             </a:r>
             <a:endParaRPr lang="en-GB" dirty="0"/>
           </a:p>
@@ -4560,7 +4672,7 @@
     </p:spTree>
     <p:extLst>
       <p:ext uri="{BB962C8B-B14F-4D97-AF65-F5344CB8AC3E}">
-        <p14:creationId xmlns:p14="http://schemas.microsoft.com/office/powerpoint/2010/main" xmlns="" val="4161036012"/>
+        <p14:creationId xmlns="" xmlns:p14="http://schemas.microsoft.com/office/powerpoint/2010/main" val="2049121592"/>
       </p:ext>
     </p:extLst>
   </p:cSld>
@@ -4603,34 +4715,49 @@
           <a:lstStyle/>
           <a:p>
             <a:r>
+              <a:rPr lang="en-GB" dirty="0" smtClean="0"/>
+              <a:t>Sesame Windows Client</a:t>
+            </a:r>
+            <a:endParaRPr lang="en-GB" dirty="0"/>
+          </a:p>
+        </p:txBody>
+      </p:sp>
+      <p:sp>
+        <p:nvSpPr>
+          <p:cNvPr id="3" name="Content Placeholder 2"/>
+          <p:cNvSpPr>
+            <a:spLocks noGrp="1"/>
+          </p:cNvSpPr>
+          <p:nvPr>
+            <p:ph idx="1"/>
+          </p:nvPr>
+        </p:nvSpPr>
+        <p:spPr/>
+        <p:txBody>
+          <a:bodyPr/>
+          <a:lstStyle/>
+          <a:p>
+            <a:r>
+              <a:rPr lang="en-GB" dirty="0" smtClean="0"/>
+              <a:t>Developed by </a:t>
+            </a:r>
+            <a:r>
               <a:rPr lang="en-GB" dirty="0" err="1" smtClean="0"/>
-              <a:t>Fuseki</a:t>
+              <a:t>Jeen</a:t>
+            </a:r>
+            <a:r>
+              <a:rPr lang="en-GB" dirty="0" smtClean="0"/>
+              <a:t> </a:t>
+            </a:r>
+            <a:r>
+              <a:rPr lang="en-GB" dirty="0" err="1" smtClean="0"/>
+              <a:t>Broekstra</a:t>
+            </a:r>
+            <a:r>
+              <a:rPr lang="en-GB" dirty="0" smtClean="0"/>
+              <a:t> and Anton Andreev</a:t>
             </a:r>
             <a:endParaRPr lang="en-GB" dirty="0"/>
-          </a:p>
-        </p:txBody>
-      </p:sp>
-      <p:sp>
-        <p:nvSpPr>
-          <p:cNvPr id="3" name="Content Placeholder 2"/>
-          <p:cNvSpPr>
-            <a:spLocks noGrp="1"/>
-          </p:cNvSpPr>
-          <p:nvPr>
-            <p:ph idx="1"/>
-          </p:nvPr>
-        </p:nvSpPr>
-        <p:spPr/>
-        <p:txBody>
-          <a:bodyPr>
-            <a:normAutofit fontScale="92500" lnSpcReduction="10000"/>
-          </a:bodyPr>
-          <a:lstStyle/>
-          <a:p>
-            <a:r>
-              <a:rPr lang="en-GB" dirty="0" smtClean="0"/>
-              <a:t>Part of the family of Jena Tooling</a:t>
-            </a:r>
           </a:p>
           <a:p>
             <a:pPr lvl="1"/>
@@ -4638,47 +4765,30 @@
               <a:rPr lang="en-GB" dirty="0">
                 <a:hlinkClick r:id="rId2"/>
               </a:rPr>
-              <a:t>http://</a:t>
+              <a:t>http://sourceforge.net/projects/sesamewinclient</a:t>
             </a:r>
             <a:r>
               <a:rPr lang="en-GB" dirty="0" smtClean="0">
                 <a:hlinkClick r:id="rId2"/>
               </a:rPr>
-              <a:t>openjena.org/wiki/Fuseki</a:t>
+              <a:t>/</a:t>
             </a:r>
             <a:endParaRPr lang="en-GB" dirty="0" smtClean="0"/>
           </a:p>
           <a:p>
             <a:r>
-              <a:rPr lang="en-GB" dirty="0" smtClean="0"/>
-              <a:t>Provides a HTTP server for SPARQL Query and Update runnable from the command line</a:t>
-            </a:r>
-          </a:p>
-          <a:p>
-            <a:r>
-              <a:rPr lang="en-GB" dirty="0" smtClean="0"/>
-              <a:t>Can use persistent TDB storage (Jena’s native triple store)</a:t>
-            </a:r>
-          </a:p>
-          <a:p>
-            <a:r>
-              <a:rPr lang="en-GB" dirty="0" smtClean="0"/>
-              <a:t>Example Usage:</a:t>
-            </a:r>
-          </a:p>
-          <a:p>
-            <a:pPr lvl="1"/>
-            <a:r>
-              <a:rPr lang="en-GB" dirty="0" smtClean="0"/>
-              <a:t>java –jar fuseki-sys.jar --update --</a:t>
-            </a:r>
-            <a:r>
               <a:rPr lang="en-GB" dirty="0" err="1" smtClean="0"/>
-              <a:t>loc</a:t>
-            </a:r>
-            <a:r>
-              <a:rPr lang="en-GB" dirty="0" smtClean="0"/>
-              <a:t>=DB</a:t>
+              <a:t>.Net</a:t>
+            </a:r>
+            <a:r>
+              <a:rPr lang="en-GB" dirty="0" smtClean="0"/>
+              <a:t> Based – needs Mono on *nix</a:t>
+            </a:r>
+          </a:p>
+          <a:p>
+            <a:r>
+              <a:rPr lang="en-GB" dirty="0" smtClean="0"/>
+              <a:t>GUI Interface primarily for Sesame though supports a limited range of other triple stores</a:t>
             </a:r>
             <a:endParaRPr lang="en-GB" dirty="0"/>
           </a:p>
@@ -4757,7 +4867,7 @@
     </p:spTree>
     <p:extLst>
       <p:ext uri="{BB962C8B-B14F-4D97-AF65-F5344CB8AC3E}">
-        <p14:creationId xmlns:p14="http://schemas.microsoft.com/office/powerpoint/2010/main" xmlns="" val="2049121592"/>
+        <p14:creationId xmlns="" xmlns:p14="http://schemas.microsoft.com/office/powerpoint/2010/main" val="705525587"/>
       </p:ext>
     </p:extLst>
   </p:cSld>
@@ -4943,7 +5053,7 @@
     </p:spTree>
     <p:extLst>
       <p:ext uri="{BB962C8B-B14F-4D97-AF65-F5344CB8AC3E}">
-        <p14:creationId xmlns:p14="http://schemas.microsoft.com/office/powerpoint/2010/main" xmlns="" val="2930425621"/>
+        <p14:creationId xmlns="" xmlns:p14="http://schemas.microsoft.com/office/powerpoint/2010/main" val="2930425621"/>
       </p:ext>
     </p:extLst>
   </p:cSld>
@@ -4977,17 +5087,17 @@
             <a:spLocks noGrp="1"/>
           </p:cNvSpPr>
           <p:nvPr>
-            <p:ph type="title"/>
-          </p:nvPr>
-        </p:nvSpPr>
-        <p:spPr/>
-        <p:txBody>
-          <a:bodyPr/>
-          <a:lstStyle/>
-          <a:p>
-            <a:r>
-              <a:rPr lang="en-GB" dirty="0" smtClean="0"/>
-              <a:t>Sesame Windows Client</a:t>
+            <p:ph type="ctrTitle"/>
+          </p:nvPr>
+        </p:nvSpPr>
+        <p:spPr/>
+        <p:txBody>
+          <a:bodyPr/>
+          <a:lstStyle/>
+          <a:p>
+            <a:r>
+              <a:rPr lang="en-GB" dirty="0" smtClean="0"/>
+              <a:t>Questions?</a:t>
             </a:r>
             <a:endParaRPr lang="en-GB" dirty="0"/>
           </a:p>
@@ -4995,150 +5105,44 @@
       </p:sp>
       <p:sp>
         <p:nvSpPr>
-          <p:cNvPr id="3" name="Content Placeholder 2"/>
-          <p:cNvSpPr>
-            <a:spLocks noGrp="1"/>
-          </p:cNvSpPr>
-          <p:nvPr>
-            <p:ph idx="1"/>
-          </p:nvPr>
-        </p:nvSpPr>
-        <p:spPr/>
-        <p:txBody>
-          <a:bodyPr/>
-          <a:lstStyle/>
-          <a:p>
-            <a:r>
-              <a:rPr lang="en-GB" dirty="0" smtClean="0"/>
-              <a:t>Developed by </a:t>
-            </a:r>
-            <a:r>
-              <a:rPr lang="en-GB" dirty="0" err="1" smtClean="0"/>
-              <a:t>Jeen</a:t>
-            </a:r>
-            <a:r>
-              <a:rPr lang="en-GB" dirty="0" smtClean="0"/>
-              <a:t> </a:t>
-            </a:r>
-            <a:r>
-              <a:rPr lang="en-GB" dirty="0" err="1" smtClean="0"/>
-              <a:t>Broekstra</a:t>
-            </a:r>
-            <a:r>
-              <a:rPr lang="en-GB" dirty="0" smtClean="0"/>
-              <a:t> and Anton Andreev</a:t>
-            </a:r>
-            <a:endParaRPr lang="en-GB" dirty="0"/>
-          </a:p>
-          <a:p>
-            <a:pPr lvl="1"/>
-            <a:r>
-              <a:rPr lang="en-GB" dirty="0">
-                <a:hlinkClick r:id="rId2"/>
-              </a:rPr>
-              <a:t>http://sourceforge.net/projects/sesamewinclient</a:t>
-            </a:r>
+          <p:cNvPr id="3" name="Subtitle 2"/>
+          <p:cNvSpPr>
+            <a:spLocks noGrp="1"/>
+          </p:cNvSpPr>
+          <p:nvPr>
+            <p:ph type="subTitle" idx="1"/>
+          </p:nvPr>
+        </p:nvSpPr>
+        <p:spPr/>
+        <p:txBody>
+          <a:bodyPr/>
+          <a:lstStyle/>
+          <a:p>
             <a:r>
               <a:rPr lang="en-GB" dirty="0" smtClean="0">
                 <a:hlinkClick r:id="rId2"/>
               </a:rPr>
-              <a:t>/</a:t>
+              <a:t>rvesse@dotnetrdf.org</a:t>
             </a:r>
             <a:endParaRPr lang="en-GB" dirty="0" smtClean="0"/>
           </a:p>
           <a:p>
             <a:r>
+              <a:rPr lang="en-GB" dirty="0" smtClean="0"/>
+              <a:t>Twitter: @</a:t>
+            </a:r>
+            <a:r>
               <a:rPr lang="en-GB" dirty="0" err="1" smtClean="0"/>
-              <a:t>.Net</a:t>
-            </a:r>
-            <a:r>
-              <a:rPr lang="en-GB" dirty="0" smtClean="0"/>
-              <a:t> Based – needs Mono on *nix</a:t>
-            </a:r>
-          </a:p>
-          <a:p>
-            <a:r>
-              <a:rPr lang="en-GB" dirty="0" smtClean="0"/>
-              <a:t>GUI Interface primarily for Sesame though supports a limited range of other triple stores</a:t>
-            </a:r>
-            <a:endParaRPr lang="en-GB" dirty="0"/>
-          </a:p>
-        </p:txBody>
-      </p:sp>
-      <p:sp>
-        <p:nvSpPr>
-          <p:cNvPr id="4" name="Date Placeholder 3"/>
-          <p:cNvSpPr>
-            <a:spLocks noGrp="1"/>
-          </p:cNvSpPr>
-          <p:nvPr>
-            <p:ph type="dt" sz="half" idx="10"/>
-          </p:nvPr>
-        </p:nvSpPr>
-        <p:spPr/>
-        <p:txBody>
-          <a:bodyPr/>
-          <a:lstStyle/>
-          <a:p>
-            <a:r>
-              <a:rPr lang="en-US" smtClean="0"/>
-              <a:t>27/9/2011</a:t>
-            </a:r>
-            <a:endParaRPr lang="en-GB"/>
-          </a:p>
-        </p:txBody>
-      </p:sp>
-      <p:sp>
-        <p:nvSpPr>
-          <p:cNvPr id="5" name="Footer Placeholder 4"/>
-          <p:cNvSpPr>
-            <a:spLocks noGrp="1"/>
-          </p:cNvSpPr>
-          <p:nvPr>
-            <p:ph type="ftr" sz="quarter" idx="11"/>
-          </p:nvPr>
-        </p:nvSpPr>
-        <p:spPr/>
-        <p:txBody>
-          <a:bodyPr/>
-          <a:lstStyle/>
-          <a:p>
-            <a:r>
-              <a:rPr lang="en-GB" smtClean="0"/>
-              <a:t>http://www.dotnetrdf.org</a:t>
-            </a:r>
-            <a:endParaRPr lang="en-GB"/>
-          </a:p>
-        </p:txBody>
-      </p:sp>
-      <p:sp>
-        <p:nvSpPr>
-          <p:cNvPr id="6" name="Slide Number Placeholder 5"/>
-          <p:cNvSpPr>
-            <a:spLocks noGrp="1"/>
-          </p:cNvSpPr>
-          <p:nvPr>
-            <p:ph type="sldNum" sz="quarter" idx="12"/>
-          </p:nvPr>
-        </p:nvSpPr>
-        <p:spPr/>
-        <p:txBody>
-          <a:bodyPr/>
-          <a:lstStyle/>
-          <a:p>
-            <a:fld id="{35128F56-7434-487A-8B29-0C024560A5F4}" type="slidenum">
-              <a:rPr lang="en-GB" smtClean="0"/>
-              <a:pPr/>
-              <a:t>19</a:t>
-            </a:fld>
-            <a:endParaRPr lang="en-GB"/>
+              <a:t>RobVesse</a:t>
+            </a:r>
+            <a:endParaRPr lang="en-GB" dirty="0" smtClean="0"/>
           </a:p>
         </p:txBody>
       </p:sp>
     </p:spTree>
     <p:extLst>
       <p:ext uri="{BB962C8B-B14F-4D97-AF65-F5344CB8AC3E}">
-        <p14:creationId xmlns:p14="http://schemas.microsoft.com/office/powerpoint/2010/main" xmlns="" val="705525587"/>
+        <p14:creationId xmlns="" xmlns:p14="http://schemas.microsoft.com/office/powerpoint/2010/main" val="3679833452"/>
       </p:ext>
     </p:extLst>
   </p:cSld>
@@ -5333,96 +5337,7 @@
     </p:spTree>
     <p:extLst>
       <p:ext uri="{BB962C8B-B14F-4D97-AF65-F5344CB8AC3E}">
-        <p14:creationId xmlns:p14="http://schemas.microsoft.com/office/powerpoint/2010/main" xmlns="" val="1040737737"/>
-      </p:ext>
-    </p:extLst>
-  </p:cSld>
-  <p:clrMapOvr>
-    <a:masterClrMapping/>
-  </p:clrMapOvr>
-</p:sld>
-</file>
-
-<file path=ppt/slides/slide20.xml><?xml version="1.0" encoding="utf-8"?>
-<p:sld xmlns:a="http://schemas.openxmlformats.org/drawingml/2006/main" xmlns:r="http://schemas.openxmlformats.org/officeDocument/2006/relationships" xmlns:p="http://schemas.openxmlformats.org/presentationml/2006/main">
-  <p:cSld>
-    <p:spTree>
-      <p:nvGrpSpPr>
-        <p:cNvPr id="1" name=""/>
-        <p:cNvGrpSpPr/>
-        <p:nvPr/>
-      </p:nvGrpSpPr>
-      <p:grpSpPr>
-        <a:xfrm>
-          <a:off x="0" y="0"/>
-          <a:ext cx="0" cy="0"/>
-          <a:chOff x="0" y="0"/>
-          <a:chExt cx="0" cy="0"/>
-        </a:xfrm>
-      </p:grpSpPr>
-      <p:sp>
-        <p:nvSpPr>
-          <p:cNvPr id="2" name="Title 1"/>
-          <p:cNvSpPr>
-            <a:spLocks noGrp="1"/>
-          </p:cNvSpPr>
-          <p:nvPr>
-            <p:ph type="ctrTitle"/>
-          </p:nvPr>
-        </p:nvSpPr>
-        <p:spPr/>
-        <p:txBody>
-          <a:bodyPr/>
-          <a:lstStyle/>
-          <a:p>
-            <a:r>
-              <a:rPr lang="en-GB" dirty="0" smtClean="0"/>
-              <a:t>Questions?</a:t>
-            </a:r>
-            <a:endParaRPr lang="en-GB" dirty="0"/>
-          </a:p>
-        </p:txBody>
-      </p:sp>
-      <p:sp>
-        <p:nvSpPr>
-          <p:cNvPr id="3" name="Subtitle 2"/>
-          <p:cNvSpPr>
-            <a:spLocks noGrp="1"/>
-          </p:cNvSpPr>
-          <p:nvPr>
-            <p:ph type="subTitle" idx="1"/>
-          </p:nvPr>
-        </p:nvSpPr>
-        <p:spPr/>
-        <p:txBody>
-          <a:bodyPr/>
-          <a:lstStyle/>
-          <a:p>
-            <a:r>
-              <a:rPr lang="en-GB" dirty="0" smtClean="0">
-                <a:hlinkClick r:id="rId2"/>
-              </a:rPr>
-              <a:t>rvesse@dotnetrdf.org</a:t>
-            </a:r>
-            <a:endParaRPr lang="en-GB" dirty="0" smtClean="0"/>
-          </a:p>
-          <a:p>
-            <a:r>
-              <a:rPr lang="en-GB" dirty="0" smtClean="0"/>
-              <a:t>Twitter: @</a:t>
-            </a:r>
-            <a:r>
-              <a:rPr lang="en-GB" dirty="0" err="1" smtClean="0"/>
-              <a:t>RobVesse</a:t>
-            </a:r>
-            <a:endParaRPr lang="en-GB" dirty="0" smtClean="0"/>
-          </a:p>
-        </p:txBody>
-      </p:sp>
-    </p:spTree>
-    <p:extLst>
-      <p:ext uri="{BB962C8B-B14F-4D97-AF65-F5344CB8AC3E}">
-        <p14:creationId xmlns:p14="http://schemas.microsoft.com/office/powerpoint/2010/main" xmlns="" val="3679833452"/>
+        <p14:creationId xmlns="" xmlns:p14="http://schemas.microsoft.com/office/powerpoint/2010/main" val="1040737737"/>
       </p:ext>
     </p:extLst>
   </p:cSld>
@@ -5595,7 +5510,7 @@
     </p:spTree>
     <p:extLst>
       <p:ext uri="{BB962C8B-B14F-4D97-AF65-F5344CB8AC3E}">
-        <p14:creationId xmlns:p14="http://schemas.microsoft.com/office/powerpoint/2010/main" xmlns="" val="4125537842"/>
+        <p14:creationId xmlns="" xmlns:p14="http://schemas.microsoft.com/office/powerpoint/2010/main" val="4125537842"/>
       </p:ext>
     </p:extLst>
   </p:cSld>
@@ -5658,14 +5573,15 @@
         <p:spPr/>
         <p:txBody>
           <a:bodyPr>
-            <a:normAutofit lnSpcReduction="10000"/>
+            <a:normAutofit/>
           </a:bodyPr>
           <a:lstStyle/>
           <a:p>
             <a:r>
               <a:rPr lang="en-GB" dirty="0" smtClean="0"/>
-              <a:t>All the tools I’m going to cover in the rest of the talk are free to use</a:t>
-            </a:r>
+              <a:t>All free to use/open source</a:t>
+            </a:r>
+            <a:endParaRPr lang="en-GB" dirty="0" smtClean="0"/>
           </a:p>
           <a:p>
             <a:pPr lvl="1"/>
@@ -5770,7 +5686,7 @@
     </p:spTree>
     <p:extLst>
       <p:ext uri="{BB962C8B-B14F-4D97-AF65-F5344CB8AC3E}">
-        <p14:creationId xmlns:p14="http://schemas.microsoft.com/office/powerpoint/2010/main" xmlns="" val="2526724232"/>
+        <p14:creationId xmlns="" xmlns:p14="http://schemas.microsoft.com/office/powerpoint/2010/main" val="2526724232"/>
       </p:ext>
     </p:extLst>
   </p:cSld>
@@ -5832,15 +5748,39 @@
         </p:nvSpPr>
         <p:spPr/>
         <p:txBody>
-          <a:bodyPr/>
-          <a:lstStyle/>
-          <a:p>
+          <a:bodyPr>
+            <a:normAutofit/>
+          </a:bodyPr>
+          <a:lstStyle/>
+          <a:p>
+            <a:r>
+              <a:rPr lang="en-GB" dirty="0" smtClean="0"/>
+              <a:t>Often you get data in format X but you need it in format Y</a:t>
+            </a:r>
+          </a:p>
+          <a:p>
+            <a:r>
+              <a:rPr lang="en-GB" dirty="0" smtClean="0"/>
+              <a:t>These utilities can convert between formats</a:t>
+            </a:r>
+            <a:endParaRPr lang="en-GB" dirty="0" smtClean="0"/>
+          </a:p>
+          <a:p>
+            <a:r>
+              <a:rPr lang="en-GB" dirty="0" smtClean="0"/>
+              <a:t>Examples</a:t>
+            </a:r>
+          </a:p>
+          <a:p>
+            <a:pPr lvl="1"/>
             <a:r>
               <a:rPr lang="en-GB" dirty="0" smtClean="0"/>
               <a:t>rapper</a:t>
             </a:r>
-          </a:p>
-          <a:p>
+            <a:endParaRPr lang="en-GB" dirty="0" smtClean="0"/>
+          </a:p>
+          <a:p>
+            <a:pPr lvl="1"/>
             <a:r>
               <a:rPr lang="en-GB" dirty="0" err="1" smtClean="0"/>
               <a:t>rdfcopy</a:t>
@@ -5848,18 +5788,12 @@
             <a:endParaRPr lang="en-GB" dirty="0" smtClean="0"/>
           </a:p>
           <a:p>
+            <a:pPr lvl="1"/>
             <a:r>
               <a:rPr lang="en-GB" dirty="0" err="1" smtClean="0"/>
               <a:t>rdfconvert</a:t>
             </a:r>
             <a:endParaRPr lang="en-GB" dirty="0" smtClean="0"/>
-          </a:p>
-          <a:p>
-            <a:r>
-              <a:rPr lang="en-GB" dirty="0" smtClean="0"/>
-              <a:t>riot</a:t>
-            </a:r>
-            <a:endParaRPr lang="en-GB" dirty="0"/>
           </a:p>
         </p:txBody>
       </p:sp>
@@ -5936,7 +5870,7 @@
     </p:spTree>
     <p:extLst>
       <p:ext uri="{BB962C8B-B14F-4D97-AF65-F5344CB8AC3E}">
-        <p14:creationId xmlns:p14="http://schemas.microsoft.com/office/powerpoint/2010/main" xmlns="" val="1379085774"/>
+        <p14:creationId xmlns="" xmlns:p14="http://schemas.microsoft.com/office/powerpoint/2010/main" val="1379085774"/>
       </p:ext>
     </p:extLst>
   </p:cSld>
@@ -6131,7 +6065,7 @@
     </p:spTree>
     <p:extLst>
       <p:ext uri="{BB962C8B-B14F-4D97-AF65-F5344CB8AC3E}">
-        <p14:creationId xmlns:p14="http://schemas.microsoft.com/office/powerpoint/2010/main" xmlns="" val="664525842"/>
+        <p14:creationId xmlns="" xmlns:p14="http://schemas.microsoft.com/office/powerpoint/2010/main" val="664525842"/>
       </p:ext>
     </p:extLst>
   </p:cSld>
@@ -6227,23 +6161,11 @@
             <a:pPr lvl="1"/>
             <a:r>
               <a:rPr lang="en-GB" dirty="0" smtClean="0"/>
-              <a:t>java </a:t>
-            </a:r>
-            <a:r>
-              <a:rPr lang="en-GB" dirty="0" err="1" smtClean="0"/>
-              <a:t>jena.rdfcopy</a:t>
-            </a:r>
-            <a:r>
-              <a:rPr lang="en-GB" dirty="0" smtClean="0"/>
-              <a:t> </a:t>
-            </a:r>
-            <a:r>
-              <a:rPr lang="en-GB" dirty="0" err="1" smtClean="0"/>
-              <a:t>input.rdf</a:t>
-            </a:r>
-            <a:r>
-              <a:rPr lang="en-GB" dirty="0" smtClean="0"/>
-              <a:t> RDF/XML N3 &gt; output.n3</a:t>
+              <a:t>rdfcopy.bat </a:t>
+            </a:r>
+            <a:r>
+              <a:rPr lang="en-GB" dirty="0" smtClean="0"/>
+              <a:t>input.rdf RDF/XML N3 &gt; output.n3</a:t>
             </a:r>
             <a:endParaRPr lang="en-GB" dirty="0"/>
           </a:p>
@@ -6322,7 +6244,7 @@
     </p:spTree>
     <p:extLst>
       <p:ext uri="{BB962C8B-B14F-4D97-AF65-F5344CB8AC3E}">
-        <p14:creationId xmlns:p14="http://schemas.microsoft.com/office/powerpoint/2010/main" xmlns="" val="1760005828"/>
+        <p14:creationId xmlns="" xmlns:p14="http://schemas.microsoft.com/office/powerpoint/2010/main" val="1760005828"/>
       </p:ext>
     </p:extLst>
   </p:cSld>
@@ -6563,7 +6485,7 @@
     </p:spTree>
     <p:extLst>
       <p:ext uri="{BB962C8B-B14F-4D97-AF65-F5344CB8AC3E}">
-        <p14:creationId xmlns:p14="http://schemas.microsoft.com/office/powerpoint/2010/main" xmlns="" val="1688459602"/>
+        <p14:creationId xmlns="" xmlns:p14="http://schemas.microsoft.com/office/powerpoint/2010/main" val="1688459602"/>
       </p:ext>
     </p:extLst>
   </p:cSld>
@@ -6607,7 +6529,7 @@
           <a:p>
             <a:r>
               <a:rPr lang="en-GB" dirty="0" smtClean="0"/>
-              <a:t>riot</a:t>
+              <a:t>Tools - Editing</a:t>
             </a:r>
             <a:endParaRPr lang="en-GB" dirty="0"/>
           </a:p>
@@ -6630,52 +6552,50 @@
           <a:p>
             <a:r>
               <a:rPr lang="en-GB" dirty="0" smtClean="0"/>
-              <a:t>Part of the Jena family of tooling</a:t>
+              <a:t>There are very few pure text editors for RDF</a:t>
             </a:r>
           </a:p>
           <a:p>
             <a:pPr lvl="1"/>
             <a:r>
-              <a:rPr lang="en-GB" dirty="0">
-                <a:hlinkClick r:id="rId2"/>
-              </a:rPr>
-              <a:t>http://</a:t>
-            </a:r>
-            <a:r>
-              <a:rPr lang="en-GB" dirty="0" smtClean="0">
-                <a:hlinkClick r:id="rId2"/>
-              </a:rPr>
-              <a:t>openjena.org/wiki/RIOT</a:t>
+              <a:rPr lang="en-GB" dirty="0" smtClean="0"/>
+              <a:t>Most are over complex and overpowered for just editing a few triples by hand </a:t>
+            </a:r>
+            <a:r>
+              <a:rPr lang="en-GB" dirty="0" err="1" smtClean="0"/>
+              <a:t>e.g</a:t>
+            </a:r>
+            <a:r>
+              <a:rPr lang="en-GB" dirty="0" smtClean="0"/>
+              <a:t> </a:t>
+            </a:r>
+            <a:r>
+              <a:rPr lang="en-GB" dirty="0" err="1" smtClean="0"/>
+              <a:t>TopBraid</a:t>
+            </a:r>
+            <a:r>
+              <a:rPr lang="en-GB" dirty="0" smtClean="0"/>
+              <a:t> Suite, </a:t>
+            </a:r>
+            <a:r>
+              <a:rPr lang="en-GB" dirty="0" err="1" smtClean="0"/>
+              <a:t>Protege</a:t>
             </a:r>
             <a:endParaRPr lang="en-GB" dirty="0" smtClean="0"/>
           </a:p>
           <a:p>
             <a:r>
               <a:rPr lang="en-GB" dirty="0" smtClean="0"/>
-              <a:t>Newer and less mature than their </a:t>
-            </a:r>
+              <a:t>Examples</a:t>
+            </a:r>
+          </a:p>
+          <a:p>
+            <a:pPr lvl="1"/>
             <a:r>
               <a:rPr lang="en-GB" dirty="0" err="1" smtClean="0"/>
-              <a:t>rdfcopy</a:t>
-            </a:r>
-            <a:r>
-              <a:rPr lang="en-GB" dirty="0" smtClean="0"/>
-              <a:t> utility</a:t>
-            </a:r>
-          </a:p>
-          <a:p>
-            <a:r>
-              <a:rPr lang="en-GB" dirty="0" smtClean="0"/>
-              <a:t>Example Usage:</a:t>
-            </a:r>
-          </a:p>
-          <a:p>
-            <a:pPr lvl="1"/>
-            <a:r>
-              <a:rPr lang="en-GB" dirty="0" smtClean="0"/>
-              <a:t>java riot </a:t>
-            </a:r>
-            <a:endParaRPr lang="en-GB" dirty="0"/>
+              <a:t>rdfEditor</a:t>
+            </a:r>
+            <a:endParaRPr lang="en-GB" dirty="0" smtClean="0"/>
           </a:p>
         </p:txBody>
       </p:sp>
@@ -6752,7 +6672,7 @@
     </p:spTree>
     <p:extLst>
       <p:ext uri="{BB962C8B-B14F-4D97-AF65-F5344CB8AC3E}">
-        <p14:creationId xmlns:p14="http://schemas.microsoft.com/office/powerpoint/2010/main" xmlns="" val="4208420243"/>
+        <p14:creationId xmlns="" xmlns:p14="http://schemas.microsoft.com/office/powerpoint/2010/main" val="2994720284"/>
       </p:ext>
     </p:extLst>
   </p:cSld>

</xml_diff>